<commit_message>
Final Edit of Chart code
</commit_message>
<xml_diff>
--- a/Visual/draft_presentation.pptx
+++ b/Visual/draft_presentation.pptx
@@ -9,9 +9,8 @@
     <p:sldId id="257" r:id="rId3"/>
     <p:sldId id="263" r:id="rId4"/>
     <p:sldId id="259" r:id="rId5"/>
-    <p:sldId id="262" r:id="rId6"/>
-    <p:sldId id="260" r:id="rId7"/>
-    <p:sldId id="261" r:id="rId8"/>
+    <p:sldId id="260" r:id="rId6"/>
+    <p:sldId id="261" r:id="rId7"/>
   </p:sldIdLst>
   <p:sldSz cx="12192000" cy="6858000"/>
   <p:notesSz cx="6858000" cy="9144000"/>
@@ -113,17 +112,16 @@
   <p:extLst>
     <p:ext uri="{521415D9-36F7-43E2-AB2F-B90AF26B5E84}">
       <p14:sectionLst xmlns:p14="http://schemas.microsoft.com/office/powerpoint/2010/main">
-        <p14:section name="Default Section" id="{5E6FC59D-5FDC-42C6-BB94-58F397BE8769}">
+        <p14:section name="Title" id="{5E6FC59D-5FDC-42C6-BB94-58F397BE8769}">
           <p14:sldIdLst>
             <p14:sldId id="256"/>
           </p14:sldIdLst>
         </p14:section>
-        <p14:section name="Untitled Section" id="{6AE301A2-6A38-4A08-867A-D1B8D3C9F8F4}">
+        <p14:section name="Content" id="{6AE301A2-6A38-4A08-867A-D1B8D3C9F8F4}">
           <p14:sldIdLst>
             <p14:sldId id="257"/>
             <p14:sldId id="263"/>
             <p14:sldId id="259"/>
-            <p14:sldId id="262"/>
             <p14:sldId id="260"/>
             <p14:sldId id="261"/>
           </p14:sldIdLst>
@@ -3601,7 +3599,7 @@
         <p:spPr/>
         <p:txBody>
           <a:bodyPr>
-            <a:normAutofit/>
+            <a:normAutofit lnSpcReduction="10000"/>
           </a:bodyPr>
           <a:lstStyle/>
           <a:p>
@@ -3618,55 +3616,57 @@
               <a:rPr lang="en-US" dirty="0">
                 <a:latin typeface="Helvetica LT Pro" panose="020B0504020202020204" pitchFamily="34" charset="0"/>
               </a:rPr>
-              <a:t>Use OLS to combine rating systems</a:t>
+              <a:t>Use OLS to create weights for different ranking systems based on 25 years of historical data</a:t>
             </a:r>
           </a:p>
           <a:p>
             <a:pPr lvl="2"/>
             <a:r>
-              <a:rPr lang="en-US" b="0" i="0" dirty="0">
+              <a:rPr lang="en-US" dirty="0" err="1">
                 <a:solidFill>
                   <a:srgbClr val="24292F"/>
                 </a:solidFill>
-                <a:effectLst/>
                 <a:latin typeface="Helvetica LT Pro" panose="020B0504020202020204" pitchFamily="34" charset="0"/>
               </a:rPr>
-              <a:t>pts_team1 - pts_team2 = b0 + b1(SRS1) + b2(SRS2) + b3(RPI1) + b4(RPI2)</a:t>
-            </a:r>
-          </a:p>
-          <a:p>
-            <a:pPr lvl="2"/>
-            <a:r>
-              <a:rPr lang="en-US" b="0" i="0" dirty="0">
+              <a:t>score_diff</a:t>
+            </a:r>
+            <a:r>
+              <a:rPr lang="en-US" dirty="0">
                 <a:solidFill>
                   <a:srgbClr val="24292F"/>
                 </a:solidFill>
-                <a:effectLst/>
                 <a:latin typeface="Helvetica LT Pro" panose="020B0504020202020204" pitchFamily="34" charset="0"/>
               </a:rPr>
-              <a:t>rank_team1 = b1(SRS1) + b3(RPI1)</a:t>
-            </a:r>
-          </a:p>
-          <a:p>
-            <a:pPr lvl="1"/>
+              <a:t> = b1(</a:t>
+            </a:r>
+            <a:r>
+              <a:rPr lang="en-US" dirty="0" err="1">
+                <a:solidFill>
+                  <a:srgbClr val="24292F"/>
+                </a:solidFill>
+                <a:latin typeface="Helvetica LT Pro" panose="020B0504020202020204" pitchFamily="34" charset="0"/>
+              </a:rPr>
+              <a:t>seed_diff</a:t>
+            </a:r>
+            <a:r>
+              <a:rPr lang="en-US" dirty="0">
+                <a:solidFill>
+                  <a:srgbClr val="24292F"/>
+                </a:solidFill>
+                <a:latin typeface="Helvetica LT Pro" panose="020B0504020202020204" pitchFamily="34" charset="0"/>
+              </a:rPr>
+              <a:t>) + b2(team1_osrs) + b3(team2_osrs) + b4(team1_dsrs) + b5(team2_dsrs) + e</a:t>
+            </a:r>
             <a:endParaRPr lang="en-US" dirty="0">
               <a:latin typeface="Helvetica LT Pro" panose="020B0504020202020204" pitchFamily="34" charset="0"/>
             </a:endParaRPr>
           </a:p>
           <a:p>
-            <a:pPr marL="457200" lvl="1" indent="0">
-              <a:buNone/>
-            </a:pPr>
-            <a:endParaRPr lang="en-US" dirty="0">
-              <a:latin typeface="Helvetica LT Pro" panose="020B0504020202020204" pitchFamily="34" charset="0"/>
-            </a:endParaRPr>
-          </a:p>
-          <a:p>
             <a:r>
               <a:rPr lang="en-US" dirty="0">
                 <a:latin typeface="Helvetica LT Pro" panose="020B0504020202020204" pitchFamily="34" charset="0"/>
               </a:rPr>
-              <a:t>Data</a:t>
+              <a:t>2022 Ranking Method</a:t>
             </a:r>
           </a:p>
           <a:p>
@@ -3675,25 +3675,106 @@
               <a:rPr lang="en-US" dirty="0">
                 <a:latin typeface="Helvetica LT Pro" panose="020B0504020202020204" pitchFamily="34" charset="0"/>
               </a:rPr>
-              <a:t>RPI</a:t>
-            </a:r>
-          </a:p>
-          <a:p>
-            <a:pPr lvl="1"/>
+              <a:t>Calculate the averages for OSRS, DSRS using beta coefficients</a:t>
+            </a:r>
+          </a:p>
+          <a:p>
+            <a:pPr lvl="2"/>
+            <a:r>
+              <a:rPr lang="en-US" dirty="0" err="1">
+                <a:latin typeface="Helvetica LT Pro" panose="020B0504020202020204" pitchFamily="34" charset="0"/>
+              </a:rPr>
+              <a:t>osrs_avg_weight</a:t>
+            </a:r>
             <a:r>
               <a:rPr lang="en-US" dirty="0">
                 <a:latin typeface="Helvetica LT Pro" panose="020B0504020202020204" pitchFamily="34" charset="0"/>
               </a:rPr>
-              <a:t>SRS</a:t>
-            </a:r>
-          </a:p>
-          <a:p>
-            <a:pPr lvl="1"/>
+              <a:t> = (b2 – b3)/2 = 1.05263</a:t>
+            </a:r>
+          </a:p>
+          <a:p>
+            <a:pPr lvl="2"/>
+            <a:r>
+              <a:rPr lang="en-US" dirty="0" err="1">
+                <a:latin typeface="Helvetica LT Pro" panose="020B0504020202020204" pitchFamily="34" charset="0"/>
+              </a:rPr>
+              <a:t>dsrs_avg_weigth</a:t>
+            </a:r>
             <a:r>
               <a:rPr lang="en-US" dirty="0">
                 <a:latin typeface="Helvetica LT Pro" panose="020B0504020202020204" pitchFamily="34" charset="0"/>
               </a:rPr>
-              <a:t>Game Data</a:t>
+              <a:t> = (b4 – b5)/2 = 1.15755</a:t>
+            </a:r>
+          </a:p>
+          <a:p>
+            <a:pPr lvl="2"/>
+            <a:r>
+              <a:rPr lang="en-US" dirty="0" err="1">
+                <a:latin typeface="Helvetica LT Pro" panose="020B0504020202020204" pitchFamily="34" charset="0"/>
+              </a:rPr>
+              <a:t>seed_diff</a:t>
+            </a:r>
+            <a:r>
+              <a:rPr lang="en-US" dirty="0">
+                <a:latin typeface="Helvetica LT Pro" panose="020B0504020202020204" pitchFamily="34" charset="0"/>
+              </a:rPr>
+              <a:t> = b1 = 0.39081</a:t>
+            </a:r>
+          </a:p>
+          <a:p>
+            <a:pPr lvl="1"/>
+            <a:r>
+              <a:rPr lang="en-US" dirty="0">
+                <a:latin typeface="Helvetica LT Pro" panose="020B0504020202020204" pitchFamily="34" charset="0"/>
+              </a:rPr>
+              <a:t>Multiply by teams 2022 ratings and sum</a:t>
+            </a:r>
+          </a:p>
+          <a:p>
+            <a:pPr lvl="2"/>
+            <a:r>
+              <a:rPr lang="en-US" dirty="0">
+                <a:latin typeface="Helvetica LT Pro" panose="020B0504020202020204" pitchFamily="34" charset="0"/>
+              </a:rPr>
+              <a:t>So, Gonzaga’s 2022 rating  = (osrs_2022 * </a:t>
+            </a:r>
+            <a:r>
+              <a:rPr lang="en-US" dirty="0" err="1">
+                <a:latin typeface="Helvetica LT Pro" panose="020B0504020202020204" pitchFamily="34" charset="0"/>
+              </a:rPr>
+              <a:t>osrs_avg</a:t>
+            </a:r>
+            <a:r>
+              <a:rPr lang="en-US" dirty="0">
+                <a:latin typeface="Helvetica LT Pro" panose="020B0504020202020204" pitchFamily="34" charset="0"/>
+              </a:rPr>
+              <a:t>) + (dsrs_2022 * </a:t>
+            </a:r>
+            <a:r>
+              <a:rPr lang="en-US" dirty="0" err="1">
+                <a:latin typeface="Helvetica LT Pro" panose="020B0504020202020204" pitchFamily="34" charset="0"/>
+              </a:rPr>
+              <a:t>dsrs_avg</a:t>
+            </a:r>
+            <a:r>
+              <a:rPr lang="en-US" dirty="0">
+                <a:latin typeface="Helvetica LT Pro" panose="020B0504020202020204" pitchFamily="34" charset="0"/>
+              </a:rPr>
+              <a:t>) + (matchup_seed_diff_2022 * </a:t>
+            </a:r>
+            <a:r>
+              <a:rPr lang="en-US" dirty="0" err="1">
+                <a:latin typeface="Helvetica LT Pro" panose="020B0504020202020204" pitchFamily="34" charset="0"/>
+              </a:rPr>
+              <a:t>seed_diff_weight</a:t>
+            </a:r>
+            <a:r>
+              <a:rPr lang="en-US" dirty="0">
+                <a:latin typeface="Helvetica LT Pro" panose="020B0504020202020204" pitchFamily="34" charset="0"/>
+              </a:rPr>
+              <a:t>)</a:t>
             </a:r>
           </a:p>
         </p:txBody>
@@ -3830,10 +3911,10 @@
       </p:sp>
       <p:pic>
         <p:nvPicPr>
-          <p:cNvPr id="6" name="Picture 5" descr="Table&#10;&#10;Description automatically generated">
-            <a:extLst>
-              <a:ext uri="{FF2B5EF4-FFF2-40B4-BE49-F238E27FC236}">
-                <a16:creationId xmlns:a16="http://schemas.microsoft.com/office/drawing/2014/main" id="{790AECF0-E1E5-40DE-A1F8-B148129D78F4}"/>
+          <p:cNvPr id="4" name="Picture 3" descr="Table&#10;&#10;Description automatically generated">
+            <a:extLst>
+              <a:ext uri="{FF2B5EF4-FFF2-40B4-BE49-F238E27FC236}">
+                <a16:creationId xmlns:a16="http://schemas.microsoft.com/office/drawing/2014/main" id="{ADEAD4B3-D69D-4F6B-94CE-91EB55C54F6E}"/>
               </a:ext>
             </a:extLst>
           </p:cNvPr>
@@ -3856,8 +3937,8 @@
         </p:blipFill>
         <p:spPr>
           <a:xfrm>
-            <a:off x="6008623" y="-297315"/>
-            <a:ext cx="5825290" cy="7996236"/>
+            <a:off x="6096000" y="0"/>
+            <a:ext cx="5395597" cy="6858000"/>
           </a:xfrm>
           <a:prstGeom prst="rect">
             <a:avLst/>
@@ -3932,42 +4013,6 @@
           </a:p>
         </p:txBody>
       </p:sp>
-      <p:pic>
-        <p:nvPicPr>
-          <p:cNvPr id="4" name="Picture 3" descr="Table&#10;&#10;Description automatically generated">
-            <a:extLst>
-              <a:ext uri="{FF2B5EF4-FFF2-40B4-BE49-F238E27FC236}">
-                <a16:creationId xmlns:a16="http://schemas.microsoft.com/office/drawing/2014/main" id="{75DCF679-A9C6-4D7B-8DF0-0F7A93986580}"/>
-              </a:ext>
-            </a:extLst>
-          </p:cNvPr>
-          <p:cNvPicPr>
-            <a:picLocks noChangeAspect="1"/>
-          </p:cNvPicPr>
-          <p:nvPr/>
-        </p:nvPicPr>
-        <p:blipFill>
-          <a:blip r:embed="rId2">
-            <a:extLst>
-              <a:ext uri="{28A0092B-C50C-407E-A947-70E740481C1C}">
-                <a14:useLocalDpi xmlns:a14="http://schemas.microsoft.com/office/drawing/2010/main" val="0"/>
-              </a:ext>
-            </a:extLst>
-          </a:blip>
-          <a:stretch>
-            <a:fillRect/>
-          </a:stretch>
-        </p:blipFill>
-        <p:spPr>
-          <a:xfrm>
-            <a:off x="5670596" y="-461768"/>
-            <a:ext cx="6058530" cy="8316398"/>
-          </a:xfrm>
-          <a:prstGeom prst="rect">
-            <a:avLst/>
-          </a:prstGeom>
-        </p:spPr>
-      </p:pic>
       <p:sp>
         <p:nvSpPr>
           <p:cNvPr id="5" name="TextBox 4">
@@ -4051,6 +4096,42 @@
           </a:p>
         </p:txBody>
       </p:sp>
+      <p:pic>
+        <p:nvPicPr>
+          <p:cNvPr id="6" name="Picture 5" descr="Table&#10;&#10;Description automatically generated">
+            <a:extLst>
+              <a:ext uri="{FF2B5EF4-FFF2-40B4-BE49-F238E27FC236}">
+                <a16:creationId xmlns:a16="http://schemas.microsoft.com/office/drawing/2014/main" id="{CDBE6084-93B7-4EA8-803C-805A91174084}"/>
+              </a:ext>
+            </a:extLst>
+          </p:cNvPr>
+          <p:cNvPicPr>
+            <a:picLocks noChangeAspect="1"/>
+          </p:cNvPicPr>
+          <p:nvPr/>
+        </p:nvPicPr>
+        <p:blipFill>
+          <a:blip r:embed="rId2">
+            <a:extLst>
+              <a:ext uri="{28A0092B-C50C-407E-A947-70E740481C1C}">
+                <a14:useLocalDpi xmlns:a14="http://schemas.microsoft.com/office/drawing/2010/main" val="0"/>
+              </a:ext>
+            </a:extLst>
+          </a:blip>
+          <a:stretch>
+            <a:fillRect/>
+          </a:stretch>
+        </p:blipFill>
+        <p:spPr>
+          <a:xfrm>
+            <a:off x="6096000" y="0"/>
+            <a:ext cx="5476707" cy="6858000"/>
+          </a:xfrm>
+          <a:prstGeom prst="rect">
+            <a:avLst/>
+          </a:prstGeom>
+        </p:spPr>
+      </p:pic>
     </p:spTree>
     <p:extLst>
       <p:ext uri="{BB962C8B-B14F-4D97-AF65-F5344CB8AC3E}">
@@ -4084,170 +4165,6 @@
           <a:chExt cx="0" cy="0"/>
         </a:xfrm>
       </p:grpSpPr>
-      <p:sp>
-        <p:nvSpPr>
-          <p:cNvPr id="2" name="Title 1">
-            <a:extLst>
-              <a:ext uri="{FF2B5EF4-FFF2-40B4-BE49-F238E27FC236}">
-                <a16:creationId xmlns:a16="http://schemas.microsoft.com/office/drawing/2014/main" id="{40714DE8-742D-4EB0-9707-17AF776FFDA5}"/>
-              </a:ext>
-            </a:extLst>
-          </p:cNvPr>
-          <p:cNvSpPr>
-            <a:spLocks noGrp="1"/>
-          </p:cNvSpPr>
-          <p:nvPr>
-            <p:ph type="title"/>
-          </p:nvPr>
-        </p:nvSpPr>
-        <p:spPr>
-          <a:xfrm>
-            <a:off x="838200" y="449780"/>
-            <a:ext cx="10515600" cy="1095507"/>
-          </a:xfrm>
-        </p:spPr>
-        <p:txBody>
-          <a:bodyPr/>
-          <a:lstStyle/>
-          <a:p>
-            <a:r>
-              <a:rPr lang="en-US" b="1" dirty="0">
-                <a:latin typeface="Helvetica LT Pro" panose="020B0504020202020204" pitchFamily="34" charset="0"/>
-              </a:rPr>
-              <a:t>Miscellaneous Visualizations</a:t>
-            </a:r>
-          </a:p>
-        </p:txBody>
-      </p:sp>
-      <p:pic>
-        <p:nvPicPr>
-          <p:cNvPr id="3076" name="Picture 4">
-            <a:extLst>
-              <a:ext uri="{FF2B5EF4-FFF2-40B4-BE49-F238E27FC236}">
-                <a16:creationId xmlns:a16="http://schemas.microsoft.com/office/drawing/2014/main" id="{2D484E81-F3B0-43AF-A4DF-50F817EFF169}"/>
-              </a:ext>
-            </a:extLst>
-          </p:cNvPr>
-          <p:cNvPicPr>
-            <a:picLocks noChangeAspect="1" noChangeArrowheads="1"/>
-          </p:cNvPicPr>
-          <p:nvPr/>
-        </p:nvPicPr>
-        <p:blipFill>
-          <a:blip r:embed="rId2">
-            <a:alphaModFix amt="85000"/>
-            <a:extLst>
-              <a:ext uri="{28A0092B-C50C-407E-A947-70E740481C1C}">
-                <a14:useLocalDpi xmlns:a14="http://schemas.microsoft.com/office/drawing/2010/main" val="0"/>
-              </a:ext>
-            </a:extLst>
-          </a:blip>
-          <a:srcRect/>
-          <a:stretch>
-            <a:fillRect/>
-          </a:stretch>
-        </p:blipFill>
-        <p:spPr bwMode="auto">
-          <a:xfrm>
-            <a:off x="567904" y="1897811"/>
-            <a:ext cx="5439675" cy="4079756"/>
-          </a:xfrm>
-          <a:prstGeom prst="rect">
-            <a:avLst/>
-          </a:prstGeom>
-          <a:noFill/>
-          <a:extLst>
-            <a:ext uri="{909E8E84-426E-40DD-AFC4-6F175D3DCCD1}">
-              <a14:hiddenFill xmlns:a14="http://schemas.microsoft.com/office/drawing/2010/main">
-                <a:solidFill>
-                  <a:srgbClr val="FFFFFF"/>
-                </a:solidFill>
-              </a14:hiddenFill>
-            </a:ext>
-          </a:extLst>
-        </p:spPr>
-      </p:pic>
-      <p:pic>
-        <p:nvPicPr>
-          <p:cNvPr id="3080" name="Picture 8">
-            <a:extLst>
-              <a:ext uri="{FF2B5EF4-FFF2-40B4-BE49-F238E27FC236}">
-                <a16:creationId xmlns:a16="http://schemas.microsoft.com/office/drawing/2014/main" id="{FEC379BE-091E-4BD8-8D3F-1D462AEE2123}"/>
-              </a:ext>
-            </a:extLst>
-          </p:cNvPr>
-          <p:cNvPicPr>
-            <a:picLocks noChangeAspect="1" noChangeArrowheads="1"/>
-          </p:cNvPicPr>
-          <p:nvPr/>
-        </p:nvPicPr>
-        <p:blipFill>
-          <a:blip r:embed="rId3">
-            <a:alphaModFix amt="85000"/>
-            <a:extLst>
-              <a:ext uri="{28A0092B-C50C-407E-A947-70E740481C1C}">
-                <a14:useLocalDpi xmlns:a14="http://schemas.microsoft.com/office/drawing/2010/main" val="0"/>
-              </a:ext>
-            </a:extLst>
-          </a:blip>
-          <a:srcRect/>
-          <a:stretch>
-            <a:fillRect/>
-          </a:stretch>
-        </p:blipFill>
-        <p:spPr bwMode="auto">
-          <a:xfrm>
-            <a:off x="6184423" y="1897811"/>
-            <a:ext cx="5439675" cy="4079756"/>
-          </a:xfrm>
-          <a:prstGeom prst="rect">
-            <a:avLst/>
-          </a:prstGeom>
-          <a:noFill/>
-          <a:extLst>
-            <a:ext uri="{909E8E84-426E-40DD-AFC4-6F175D3DCCD1}">
-              <a14:hiddenFill xmlns:a14="http://schemas.microsoft.com/office/drawing/2010/main">
-                <a:solidFill>
-                  <a:srgbClr val="FFFFFF"/>
-                </a:solidFill>
-              </a14:hiddenFill>
-            </a:ext>
-          </a:extLst>
-        </p:spPr>
-      </p:pic>
-    </p:spTree>
-    <p:extLst>
-      <p:ext uri="{BB962C8B-B14F-4D97-AF65-F5344CB8AC3E}">
-        <p14:creationId xmlns:p14="http://schemas.microsoft.com/office/powerpoint/2010/main" val="2760958445"/>
-      </p:ext>
-    </p:extLst>
-  </p:cSld>
-  <p:clrMapOvr>
-    <a:masterClrMapping/>
-  </p:clrMapOvr>
-  <p:transition spd="med">
-    <p:pull/>
-  </p:transition>
-</p:sld>
-</file>
-
-<file path=ppt/slides/slide6.xml><?xml version="1.0" encoding="utf-8"?>
-<p:sld xmlns:a="http://schemas.openxmlformats.org/drawingml/2006/main" xmlns:r="http://schemas.openxmlformats.org/officeDocument/2006/relationships" xmlns:p="http://schemas.openxmlformats.org/presentationml/2006/main">
-  <p:cSld>
-    <p:spTree>
-      <p:nvGrpSpPr>
-        <p:cNvPr id="1" name=""/>
-        <p:cNvGrpSpPr/>
-        <p:nvPr/>
-      </p:nvGrpSpPr>
-      <p:grpSpPr>
-        <a:xfrm>
-          <a:off x="0" y="0"/>
-          <a:ext cx="0" cy="0"/>
-          <a:chOff x="0" y="0"/>
-          <a:chExt cx="0" cy="0"/>
-        </a:xfrm>
-      </p:grpSpPr>
       <p:pic>
         <p:nvPicPr>
           <p:cNvPr id="4098" name="Picture 2" descr="See the source image">
@@ -4373,7 +4290,7 @@
               <a:rPr lang="en-US" dirty="0">
                 <a:latin typeface="Helvetica LT Pro" panose="020B0504020202020204" pitchFamily="34" charset="0"/>
               </a:rPr>
-              <a:t>Current tournament outcomes place bracket in ~50</a:t>
+              <a:t>Current tournament outcomes place our bracket in ~50</a:t>
             </a:r>
             <a:r>
               <a:rPr lang="en-US" baseline="30000" dirty="0">
@@ -4385,7 +4302,7 @@
               <a:rPr lang="en-US" dirty="0">
                 <a:latin typeface="Helvetica LT Pro" panose="020B0504020202020204" pitchFamily="34" charset="0"/>
               </a:rPr>
-              <a:t> percentile range</a:t>
+              <a:t> percentile range.</a:t>
             </a:r>
           </a:p>
           <a:p>
@@ -4426,7 +4343,7 @@
 </p:sld>
 </file>
 
-<file path=ppt/slides/slide7.xml><?xml version="1.0" encoding="utf-8"?>
+<file path=ppt/slides/slide6.xml><?xml version="1.0" encoding="utf-8"?>
 <p:sld xmlns:a="http://schemas.openxmlformats.org/drawingml/2006/main" xmlns:r="http://schemas.openxmlformats.org/officeDocument/2006/relationships" xmlns:p="http://schemas.openxmlformats.org/presentationml/2006/main">
   <p:cSld>
     <p:spTree>

</xml_diff>

<commit_message>
Re-Re uploading final powerpoint and tables.
</commit_message>
<xml_diff>
--- a/Visual/draft_presentation.pptx
+++ b/Visual/draft_presentation.pptx
@@ -3379,7 +3379,7 @@
         </p:blipFill>
         <p:spPr bwMode="auto">
           <a:xfrm>
-            <a:off x="90488" y="23813"/>
+            <a:off x="90487" y="0"/>
             <a:ext cx="12011025" cy="6810375"/>
           </a:xfrm>
           <a:prstGeom prst="rect">
@@ -3429,7 +3429,19 @@
               <a:rPr lang="en-US" sz="5400" b="1" dirty="0">
                 <a:latin typeface="Helvetica LT Pro" panose="020B0504020202020204" pitchFamily="34" charset="0"/>
               </a:rPr>
-              <a:t>Improving NCAA Rankings</a:t>
+              <a:t>Lazy </a:t>
+            </a:r>
+            <a:r>
+              <a:rPr lang="en-US" sz="5400" b="1" i="1" dirty="0">
+                <a:latin typeface="Helvetica LT Pro" panose="020B0504020202020204" pitchFamily="34" charset="0"/>
+              </a:rPr>
+              <a:t>NCAA</a:t>
+            </a:r>
+            <a:r>
+              <a:rPr lang="en-US" sz="5400" b="1" dirty="0">
+                <a:latin typeface="Helvetica LT Pro" panose="020B0504020202020204" pitchFamily="34" charset="0"/>
+              </a:rPr>
+              <a:t> Brackets</a:t>
             </a:r>
           </a:p>
         </p:txBody>
@@ -3563,19 +3575,21 @@
         </p:nvSpPr>
         <p:spPr>
           <a:xfrm>
-            <a:off x="838200" y="377753"/>
-            <a:ext cx="10515600" cy="1205057"/>
+            <a:off x="268373" y="2574061"/>
+            <a:ext cx="3477242" cy="1205057"/>
           </a:xfrm>
         </p:spPr>
         <p:txBody>
-          <a:bodyPr/>
+          <a:bodyPr>
+            <a:normAutofit fontScale="90000"/>
+          </a:bodyPr>
           <a:lstStyle/>
           <a:p>
             <a:r>
               <a:rPr lang="en-US" b="1" dirty="0">
                 <a:latin typeface="Helvetica LT Pro" panose="020B0504020202020204" pitchFamily="34" charset="0"/>
               </a:rPr>
-              <a:t>Strategy &amp; Data</a:t>
+              <a:t>Strategy &amp; Data Analysis</a:t>
             </a:r>
           </a:p>
         </p:txBody>
@@ -3599,186 +3613,59 @@
         <p:spPr/>
         <p:txBody>
           <a:bodyPr>
-            <a:normAutofit lnSpcReduction="10000"/>
+            <a:normAutofit/>
           </a:bodyPr>
           <a:lstStyle/>
           <a:p>
-            <a:r>
-              <a:rPr lang="en-US" dirty="0">
-                <a:latin typeface="Helvetica LT Pro" panose="020B0504020202020204" pitchFamily="34" charset="0"/>
-              </a:rPr>
-              <a:t>Strategy</a:t>
-            </a:r>
-          </a:p>
-          <a:p>
             <a:pPr lvl="1"/>
-            <a:r>
-              <a:rPr lang="en-US" dirty="0">
-                <a:latin typeface="Helvetica LT Pro" panose="020B0504020202020204" pitchFamily="34" charset="0"/>
-              </a:rPr>
-              <a:t>Use OLS to create weights for different ranking systems based on 25 years of historical data</a:t>
-            </a:r>
-          </a:p>
-          <a:p>
-            <a:pPr lvl="2"/>
-            <a:r>
-              <a:rPr lang="en-US" dirty="0" err="1">
-                <a:solidFill>
-                  <a:srgbClr val="24292F"/>
-                </a:solidFill>
-                <a:latin typeface="Helvetica LT Pro" panose="020B0504020202020204" pitchFamily="34" charset="0"/>
-              </a:rPr>
-              <a:t>score_diff</a:t>
-            </a:r>
-            <a:r>
-              <a:rPr lang="en-US" dirty="0">
-                <a:solidFill>
-                  <a:srgbClr val="24292F"/>
-                </a:solidFill>
-                <a:latin typeface="Helvetica LT Pro" panose="020B0504020202020204" pitchFamily="34" charset="0"/>
-              </a:rPr>
-              <a:t> = b1(</a:t>
-            </a:r>
-            <a:r>
-              <a:rPr lang="en-US" dirty="0" err="1">
-                <a:solidFill>
-                  <a:srgbClr val="24292F"/>
-                </a:solidFill>
-                <a:latin typeface="Helvetica LT Pro" panose="020B0504020202020204" pitchFamily="34" charset="0"/>
-              </a:rPr>
-              <a:t>seed_diff</a:t>
-            </a:r>
-            <a:r>
-              <a:rPr lang="en-US" dirty="0">
-                <a:solidFill>
-                  <a:srgbClr val="24292F"/>
-                </a:solidFill>
-                <a:latin typeface="Helvetica LT Pro" panose="020B0504020202020204" pitchFamily="34" charset="0"/>
-              </a:rPr>
-              <a:t>) + b2(team1_osrs) + b3(team2_osrs) + b4(team1_dsrs) + b5(team2_dsrs) + e</a:t>
-            </a:r>
             <a:endParaRPr lang="en-US" dirty="0">
               <a:latin typeface="Helvetica LT Pro" panose="020B0504020202020204" pitchFamily="34" charset="0"/>
             </a:endParaRPr>
           </a:p>
           <a:p>
-            <a:r>
-              <a:rPr lang="en-US" dirty="0">
-                <a:latin typeface="Helvetica LT Pro" panose="020B0504020202020204" pitchFamily="34" charset="0"/>
-              </a:rPr>
-              <a:t>2022 Ranking Method</a:t>
-            </a:r>
-          </a:p>
-          <a:p>
             <a:pPr lvl="1"/>
-            <a:r>
-              <a:rPr lang="en-US" dirty="0">
-                <a:latin typeface="Helvetica LT Pro" panose="020B0504020202020204" pitchFamily="34" charset="0"/>
-              </a:rPr>
-              <a:t>Calculate the averages for OSRS, DSRS using beta coefficients</a:t>
-            </a:r>
-          </a:p>
-          <a:p>
-            <a:pPr lvl="2"/>
-            <a:r>
-              <a:rPr lang="en-US" dirty="0" err="1">
-                <a:latin typeface="Helvetica LT Pro" panose="020B0504020202020204" pitchFamily="34" charset="0"/>
-              </a:rPr>
-              <a:t>osrs_avg_weight</a:t>
-            </a:r>
-            <a:r>
-              <a:rPr lang="en-US" dirty="0">
-                <a:latin typeface="Helvetica LT Pro" panose="020B0504020202020204" pitchFamily="34" charset="0"/>
-              </a:rPr>
-              <a:t> = (b2 – b3)/2 = 1.05263</a:t>
-            </a:r>
-          </a:p>
-          <a:p>
-            <a:pPr lvl="2"/>
-            <a:r>
-              <a:rPr lang="en-US" dirty="0" err="1">
-                <a:latin typeface="Helvetica LT Pro" panose="020B0504020202020204" pitchFamily="34" charset="0"/>
-              </a:rPr>
-              <a:t>dsrs_avg_weigth</a:t>
-            </a:r>
-            <a:r>
-              <a:rPr lang="en-US" dirty="0">
-                <a:latin typeface="Helvetica LT Pro" panose="020B0504020202020204" pitchFamily="34" charset="0"/>
-              </a:rPr>
-              <a:t> = (b4 – b5)/2 = 1.15755</a:t>
-            </a:r>
-          </a:p>
-          <a:p>
-            <a:pPr lvl="2"/>
-            <a:r>
-              <a:rPr lang="en-US" dirty="0" err="1">
-                <a:latin typeface="Helvetica LT Pro" panose="020B0504020202020204" pitchFamily="34" charset="0"/>
-              </a:rPr>
-              <a:t>seed_diff</a:t>
-            </a:r>
-            <a:r>
-              <a:rPr lang="en-US" dirty="0">
-                <a:latin typeface="Helvetica LT Pro" panose="020B0504020202020204" pitchFamily="34" charset="0"/>
-              </a:rPr>
-              <a:t> = b1 = 0.39081</a:t>
-            </a:r>
-          </a:p>
-          <a:p>
-            <a:pPr lvl="1"/>
-            <a:r>
-              <a:rPr lang="en-US" dirty="0">
-                <a:latin typeface="Helvetica LT Pro" panose="020B0504020202020204" pitchFamily="34" charset="0"/>
-              </a:rPr>
-              <a:t>Multiply by teams 2022 ratings and sum</a:t>
-            </a:r>
-          </a:p>
-          <a:p>
-            <a:pPr lvl="2"/>
-            <a:r>
-              <a:rPr lang="en-US" dirty="0">
-                <a:latin typeface="Helvetica LT Pro" panose="020B0504020202020204" pitchFamily="34" charset="0"/>
-              </a:rPr>
-              <a:t>So, Gonzaga’s 2022 rating  = (osrs_2022 * </a:t>
-            </a:r>
-            <a:r>
-              <a:rPr lang="en-US" dirty="0" err="1">
-                <a:latin typeface="Helvetica LT Pro" panose="020B0504020202020204" pitchFamily="34" charset="0"/>
-              </a:rPr>
-              <a:t>osrs_avg</a:t>
-            </a:r>
-            <a:r>
-              <a:rPr lang="en-US" dirty="0">
-                <a:latin typeface="Helvetica LT Pro" panose="020B0504020202020204" pitchFamily="34" charset="0"/>
-              </a:rPr>
-              <a:t>) + (dsrs_2022 * </a:t>
-            </a:r>
-            <a:r>
-              <a:rPr lang="en-US" dirty="0" err="1">
-                <a:latin typeface="Helvetica LT Pro" panose="020B0504020202020204" pitchFamily="34" charset="0"/>
-              </a:rPr>
-              <a:t>dsrs_avg</a:t>
-            </a:r>
-            <a:r>
-              <a:rPr lang="en-US" dirty="0">
-                <a:latin typeface="Helvetica LT Pro" panose="020B0504020202020204" pitchFamily="34" charset="0"/>
-              </a:rPr>
-              <a:t>) + (matchup_seed_diff_2022 * </a:t>
-            </a:r>
-            <a:r>
-              <a:rPr lang="en-US" dirty="0" err="1">
-                <a:latin typeface="Helvetica LT Pro" panose="020B0504020202020204" pitchFamily="34" charset="0"/>
-              </a:rPr>
-              <a:t>seed_diff_weight</a:t>
-            </a:r>
-            <a:r>
-              <a:rPr lang="en-US" dirty="0">
-                <a:latin typeface="Helvetica LT Pro" panose="020B0504020202020204" pitchFamily="34" charset="0"/>
-              </a:rPr>
-              <a:t>)</a:t>
-            </a:r>
-          </a:p>
-        </p:txBody>
-      </p:sp>
+            <a:endParaRPr lang="en-US" dirty="0">
+              <a:latin typeface="Helvetica LT Pro" panose="020B0504020202020204" pitchFamily="34" charset="0"/>
+            </a:endParaRPr>
+          </a:p>
+        </p:txBody>
+      </p:sp>
+      <p:pic>
+        <p:nvPicPr>
+          <p:cNvPr id="13" name="Picture 12" descr="Text&#10;&#10;Description automatically generated">
+            <a:extLst>
+              <a:ext uri="{FF2B5EF4-FFF2-40B4-BE49-F238E27FC236}">
+                <a16:creationId xmlns:a16="http://schemas.microsoft.com/office/drawing/2014/main" id="{869B701F-32BB-48A4-8AC0-7FE000B03CEE}"/>
+              </a:ext>
+            </a:extLst>
+          </p:cNvPr>
+          <p:cNvPicPr>
+            <a:picLocks noChangeAspect="1"/>
+          </p:cNvPicPr>
+          <p:nvPr/>
+        </p:nvPicPr>
+        <p:blipFill>
+          <a:blip r:embed="rId3">
+            <a:extLst>
+              <a:ext uri="{28A0092B-C50C-407E-A947-70E740481C1C}">
+                <a14:useLocalDpi xmlns:a14="http://schemas.microsoft.com/office/drawing/2010/main" val="0"/>
+              </a:ext>
+            </a:extLst>
+          </a:blip>
+          <a:stretch>
+            <a:fillRect/>
+          </a:stretch>
+        </p:blipFill>
+        <p:spPr>
+          <a:xfrm>
+            <a:off x="4200565" y="328073"/>
+            <a:ext cx="7723062" cy="6201853"/>
+          </a:xfrm>
+          <a:prstGeom prst="rect">
+            <a:avLst/>
+          </a:prstGeom>
+        </p:spPr>
+      </p:pic>
     </p:spTree>
     <p:extLst>
       <p:ext uri="{BB962C8B-B14F-4D97-AF65-F5344CB8AC3E}">
@@ -3861,8 +3748,8 @@
         </p:nvSpPr>
         <p:spPr>
           <a:xfrm>
-            <a:off x="838200" y="2274838"/>
-            <a:ext cx="4170716" cy="2677656"/>
+            <a:off x="838200" y="1545287"/>
+            <a:ext cx="10279325" cy="1569660"/>
           </a:xfrm>
           <a:prstGeom prst="rect">
             <a:avLst/>
@@ -3911,10 +3798,10 @@
       </p:sp>
       <p:pic>
         <p:nvPicPr>
-          <p:cNvPr id="4" name="Picture 3" descr="Table&#10;&#10;Description automatically generated">
-            <a:extLst>
-              <a:ext uri="{FF2B5EF4-FFF2-40B4-BE49-F238E27FC236}">
-                <a16:creationId xmlns:a16="http://schemas.microsoft.com/office/drawing/2014/main" id="{ADEAD4B3-D69D-4F6B-94CE-91EB55C54F6E}"/>
+          <p:cNvPr id="6" name="Picture 5" descr="Table&#10;&#10;Description automatically generated">
+            <a:extLst>
+              <a:ext uri="{FF2B5EF4-FFF2-40B4-BE49-F238E27FC236}">
+                <a16:creationId xmlns:a16="http://schemas.microsoft.com/office/drawing/2014/main" id="{FD9EE4F2-8369-4367-B6BB-80292F9AB661}"/>
               </a:ext>
             </a:extLst>
           </p:cNvPr>
@@ -3937,8 +3824,44 @@
         </p:blipFill>
         <p:spPr>
           <a:xfrm>
-            <a:off x="6096000" y="0"/>
-            <a:ext cx="5395597" cy="6858000"/>
+            <a:off x="6325916" y="3268675"/>
+            <a:ext cx="5027884" cy="3235136"/>
+          </a:xfrm>
+          <a:prstGeom prst="rect">
+            <a:avLst/>
+          </a:prstGeom>
+        </p:spPr>
+      </p:pic>
+      <p:pic>
+        <p:nvPicPr>
+          <p:cNvPr id="8" name="Picture 7" descr="Table&#10;&#10;Description automatically generated">
+            <a:extLst>
+              <a:ext uri="{FF2B5EF4-FFF2-40B4-BE49-F238E27FC236}">
+                <a16:creationId xmlns:a16="http://schemas.microsoft.com/office/drawing/2014/main" id="{FE8D2744-2EC0-4FCA-B0EA-716962137F2B}"/>
+              </a:ext>
+            </a:extLst>
+          </p:cNvPr>
+          <p:cNvPicPr>
+            <a:picLocks noChangeAspect="1"/>
+          </p:cNvPicPr>
+          <p:nvPr/>
+        </p:nvPicPr>
+        <p:blipFill>
+          <a:blip r:embed="rId3">
+            <a:extLst>
+              <a:ext uri="{28A0092B-C50C-407E-A947-70E740481C1C}">
+                <a14:useLocalDpi xmlns:a14="http://schemas.microsoft.com/office/drawing/2010/main" val="0"/>
+              </a:ext>
+            </a:extLst>
+          </a:blip>
+          <a:stretch>
+            <a:fillRect/>
+          </a:stretch>
+        </p:blipFill>
+        <p:spPr>
+          <a:xfrm>
+            <a:off x="838200" y="3198131"/>
+            <a:ext cx="5375114" cy="3305577"/>
           </a:xfrm>
           <a:prstGeom prst="rect">
             <a:avLst/>
@@ -4027,8 +3950,8 @@
         </p:nvSpPr>
         <p:spPr>
           <a:xfrm>
-            <a:off x="838200" y="1720840"/>
-            <a:ext cx="4170716" cy="3785652"/>
+            <a:off x="838200" y="1545287"/>
+            <a:ext cx="10785863" cy="830997"/>
           </a:xfrm>
           <a:prstGeom prst="rect">
             <a:avLst/>
@@ -4049,7 +3972,19 @@
               <a:rPr lang="en-US" sz="2400" dirty="0">
                 <a:latin typeface="Helvetica LT Pro" panose="020B0504020202020204" pitchFamily="34" charset="0"/>
               </a:rPr>
-              <a:t>Gonzaga predicted to win game 67, making it the NCAA champion</a:t>
+              <a:t>Gonzaga predicted to win game 67, making it the </a:t>
+            </a:r>
+            <a:r>
+              <a:rPr lang="en-US" sz="2400" i="1" dirty="0">
+                <a:latin typeface="Helvetica LT Pro" panose="020B0504020202020204" pitchFamily="34" charset="0"/>
+              </a:rPr>
+              <a:t>NCAA</a:t>
+            </a:r>
+            <a:r>
+              <a:rPr lang="en-US" sz="2400" dirty="0">
+                <a:latin typeface="Helvetica LT Pro" panose="020B0504020202020204" pitchFamily="34" charset="0"/>
+              </a:rPr>
+              <a:t> champion</a:t>
             </a:r>
           </a:p>
           <a:p>
@@ -4061,47 +3996,14 @@
               <a:latin typeface="Helvetica LT Pro" panose="020B0504020202020204" pitchFamily="34" charset="0"/>
             </a:endParaRPr>
           </a:p>
-          <a:p>
-            <a:pPr marL="285750" indent="-285750">
-              <a:buFont typeface="Arial" panose="020B0604020202020204" pitchFamily="34" charset="0"/>
-              <a:buChar char="•"/>
-            </a:pPr>
-            <a:r>
-              <a:rPr lang="en-US" sz="2400" dirty="0">
-                <a:latin typeface="Helvetica LT Pro" panose="020B0504020202020204" pitchFamily="34" charset="0"/>
-              </a:rPr>
-              <a:t>Arizona predicted to come in second, losing to Gonzaga</a:t>
-            </a:r>
-          </a:p>
-          <a:p>
-            <a:pPr marL="285750" indent="-285750">
-              <a:buFont typeface="Arial" panose="020B0604020202020204" pitchFamily="34" charset="0"/>
-              <a:buChar char="•"/>
-            </a:pPr>
-            <a:endParaRPr lang="en-US" sz="2400" dirty="0">
-              <a:latin typeface="Helvetica LT Pro" panose="020B0504020202020204" pitchFamily="34" charset="0"/>
-            </a:endParaRPr>
-          </a:p>
-          <a:p>
-            <a:pPr marL="285750" indent="-285750">
-              <a:buFont typeface="Arial" panose="020B0604020202020204" pitchFamily="34" charset="0"/>
-              <a:buChar char="•"/>
-            </a:pPr>
-            <a:r>
-              <a:rPr lang="en-US" sz="2400" dirty="0">
-                <a:latin typeface="Helvetica LT Pro" panose="020B0504020202020204" pitchFamily="34" charset="0"/>
-              </a:rPr>
-              <a:t>Auburn predicted to come in third, losing to Arizona</a:t>
-            </a:r>
-          </a:p>
         </p:txBody>
       </p:sp>
       <p:pic>
         <p:nvPicPr>
-          <p:cNvPr id="6" name="Picture 5" descr="Table&#10;&#10;Description automatically generated">
-            <a:extLst>
-              <a:ext uri="{FF2B5EF4-FFF2-40B4-BE49-F238E27FC236}">
-                <a16:creationId xmlns:a16="http://schemas.microsoft.com/office/drawing/2014/main" id="{CDBE6084-93B7-4EA8-803C-805A91174084}"/>
+          <p:cNvPr id="4" name="Picture 3" descr="Table&#10;&#10;Description automatically generated">
+            <a:extLst>
+              <a:ext uri="{FF2B5EF4-FFF2-40B4-BE49-F238E27FC236}">
+                <a16:creationId xmlns:a16="http://schemas.microsoft.com/office/drawing/2014/main" id="{2A3BDD98-2265-4A81-8E96-008919FF9A52}"/>
               </a:ext>
             </a:extLst>
           </p:cNvPr>
@@ -4124,8 +4026,44 @@
         </p:blipFill>
         <p:spPr>
           <a:xfrm>
-            <a:off x="6096000" y="0"/>
-            <a:ext cx="5476707" cy="6858000"/>
+            <a:off x="838200" y="2295869"/>
+            <a:ext cx="5432894" cy="4363386"/>
+          </a:xfrm>
+          <a:prstGeom prst="rect">
+            <a:avLst/>
+          </a:prstGeom>
+        </p:spPr>
+      </p:pic>
+      <p:pic>
+        <p:nvPicPr>
+          <p:cNvPr id="8" name="Picture 7" descr="Table&#10;&#10;Description automatically generated">
+            <a:extLst>
+              <a:ext uri="{FF2B5EF4-FFF2-40B4-BE49-F238E27FC236}">
+                <a16:creationId xmlns:a16="http://schemas.microsoft.com/office/drawing/2014/main" id="{A2EA4C1E-30B9-4467-A45A-5A941A95F5F2}"/>
+              </a:ext>
+            </a:extLst>
+          </p:cNvPr>
+          <p:cNvPicPr>
+            <a:picLocks noChangeAspect="1"/>
+          </p:cNvPicPr>
+          <p:nvPr/>
+        </p:nvPicPr>
+        <p:blipFill>
+          <a:blip r:embed="rId3">
+            <a:extLst>
+              <a:ext uri="{28A0092B-C50C-407E-A947-70E740481C1C}">
+                <a14:useLocalDpi xmlns:a14="http://schemas.microsoft.com/office/drawing/2010/main" val="0"/>
+              </a:ext>
+            </a:extLst>
+          </a:blip>
+          <a:stretch>
+            <a:fillRect/>
+          </a:stretch>
+        </p:blipFill>
+        <p:spPr>
+          <a:xfrm>
+            <a:off x="6374486" y="2376284"/>
+            <a:ext cx="4810421" cy="4363387"/>
           </a:xfrm>
           <a:prstGeom prst="rect">
             <a:avLst/>
@@ -4290,7 +4228,7 @@
               <a:rPr lang="en-US" dirty="0">
                 <a:latin typeface="Helvetica LT Pro" panose="020B0504020202020204" pitchFamily="34" charset="0"/>
               </a:rPr>
-              <a:t>Current tournament outcomes place our bracket in ~50</a:t>
+              <a:t>Current tournament outcomes place our bracket slightly above the 50</a:t>
             </a:r>
             <a:r>
               <a:rPr lang="en-US" baseline="30000" dirty="0">

</xml_diff>